<commit_message>
Update fix for SQLite keys
</commit_message>
<xml_diff>
--- a/Presentation.pptx
+++ b/Presentation.pptx
@@ -4437,7 +4437,7 @@
         </p:blipFill>
         <p:spPr>
           <a:xfrm>
-            <a:off x="7286625" y="4561982"/>
+            <a:off x="7301016" y="4225250"/>
             <a:ext cx="2752933" cy="821771"/>
           </a:xfrm>
           <a:prstGeom prst="rect">
@@ -4467,7 +4467,7 @@
         </p:blipFill>
         <p:spPr>
           <a:xfrm>
-            <a:off x="1638955" y="2411441"/>
+            <a:off x="1170761" y="1691323"/>
             <a:ext cx="1255247" cy="1255247"/>
           </a:xfrm>
           <a:prstGeom prst="rect">
@@ -4497,7 +4497,7 @@
         </p:blipFill>
         <p:spPr>
           <a:xfrm>
-            <a:off x="3143512" y="2332590"/>
+            <a:off x="1319053" y="3679046"/>
             <a:ext cx="3301942" cy="871030"/>
           </a:xfrm>
           <a:prstGeom prst="rect">
@@ -4527,7 +4527,7 @@
         </p:blipFill>
         <p:spPr>
           <a:xfrm>
-            <a:off x="5279968" y="3723782"/>
+            <a:off x="5414962" y="3888642"/>
             <a:ext cx="1362075" cy="1676400"/>
           </a:xfrm>
           <a:prstGeom prst="rect">
@@ -4557,7 +4557,7 @@
         </p:blipFill>
         <p:spPr>
           <a:xfrm>
-            <a:off x="1651637" y="4127136"/>
+            <a:off x="1637246" y="4726842"/>
             <a:ext cx="2983749" cy="1256617"/>
           </a:xfrm>
           <a:prstGeom prst="rect">
@@ -4587,8 +4587,68 @@
         </p:blipFill>
         <p:spPr>
           <a:xfrm>
-            <a:off x="7120041" y="2411441"/>
+            <a:off x="4782134" y="1691323"/>
             <a:ext cx="3086100" cy="1619250"/>
+          </a:xfrm>
+          <a:prstGeom prst="rect">
+            <a:avLst/>
+          </a:prstGeom>
+        </p:spPr>
+      </p:pic>
+      <p:pic>
+        <p:nvPicPr>
+          <p:cNvPr id="20" name="Picture 19">
+            <a:extLst>
+              <a:ext uri="{FF2B5EF4-FFF2-40B4-BE49-F238E27FC236}">
+                <a16:creationId xmlns:a16="http://schemas.microsoft.com/office/drawing/2014/main" id="{0A0077FA-1E9D-441E-858A-94CF3636ABDB}"/>
+              </a:ext>
+            </a:extLst>
+          </p:cNvPr>
+          <p:cNvPicPr>
+            <a:picLocks noChangeAspect="1"/>
+          </p:cNvPicPr>
+          <p:nvPr/>
+        </p:nvPicPr>
+        <p:blipFill>
+          <a:blip r:embed="rId8"/>
+          <a:stretch>
+            <a:fillRect/>
+          </a:stretch>
+        </p:blipFill>
+        <p:spPr>
+          <a:xfrm>
+            <a:off x="8109134" y="1703151"/>
+            <a:ext cx="2042031" cy="2117917"/>
+          </a:xfrm>
+          <a:prstGeom prst="rect">
+            <a:avLst/>
+          </a:prstGeom>
+        </p:spPr>
+      </p:pic>
+      <p:pic>
+        <p:nvPicPr>
+          <p:cNvPr id="22" name="Picture 21">
+            <a:extLst>
+              <a:ext uri="{FF2B5EF4-FFF2-40B4-BE49-F238E27FC236}">
+                <a16:creationId xmlns:a16="http://schemas.microsoft.com/office/drawing/2014/main" id="{F2851FE3-3B96-4676-9C57-BD7E5D24B21B}"/>
+              </a:ext>
+            </a:extLst>
+          </p:cNvPr>
+          <p:cNvPicPr>
+            <a:picLocks noChangeAspect="1"/>
+          </p:cNvPicPr>
+          <p:nvPr/>
+        </p:nvPicPr>
+        <p:blipFill>
+          <a:blip r:embed="rId9"/>
+          <a:stretch>
+            <a:fillRect/>
+          </a:stretch>
+        </p:blipFill>
+        <p:spPr>
+          <a:xfrm>
+            <a:off x="2615590" y="1651953"/>
+            <a:ext cx="1255247" cy="1850327"/>
           </a:xfrm>
           <a:prstGeom prst="rect">
             <a:avLst/>

</xml_diff>